<commit_message>
Fix corporate deck header alignment and footer overlap
- Set header text vertical anchor to center (was top-aligned,
  causing text to look off-balance in the dark header bar)
- Move Confidential text on slides 10-11 from right edge to
  center position to prevent overlap with page numbers

Co-Authored-By: Claude Opus 4.6 <noreply@anthropic.com>
</commit_message>
<xml_diff>
--- a/timeless-coach-corporate.pptx
+++ b/timeless-coach-corporate.pptx
@@ -4082,21 +4082,21 @@
         </p:nvSpPr>
         <p:spPr>
           <a:xfrm>
-            <a:off x="7315200" y="4645152"/>
-            <a:ext cx="1371600" cy="320040"/>
-          </a:xfrm>
-          <a:prstGeom prst="rect">
-            <a:avLst/>
-          </a:prstGeom>
-          <a:noFill/>
-        </p:spPr>
-        <p:txBody>
-          <a:bodyPr wrap="square">
-            <a:spAutoFit/>
-          </a:bodyPr>
-          <a:lstStyle/>
-          <a:p>
-            <a:pPr algn="r">
+            <a:off x="3657600" y="4645152"/>
+            <a:ext cx="1828800" cy="320040"/>
+          </a:xfrm>
+          <a:prstGeom prst="rect">
+            <a:avLst/>
+          </a:prstGeom>
+          <a:noFill/>
+        </p:spPr>
+        <p:txBody>
+          <a:bodyPr wrap="square">
+            <a:spAutoFit/>
+          </a:bodyPr>
+          <a:lstStyle/>
+          <a:p>
+            <a:pPr algn="ctr">
               <a:defRPr sz="900" b="0">
                 <a:solidFill>
                   <a:srgbClr val="94A3B8"/>
@@ -4132,7 +4132,7 @@
           </a:bodyPr>
           <a:lstStyle/>
           <a:p>
-            <a:pPr algn="l">
+            <a:pPr algn="r">
               <a:defRPr sz="900" b="1">
                 <a:solidFill>
                   <a:srgbClr val="94A3B8"/>
@@ -4334,21 +4334,21 @@
         </p:nvSpPr>
         <p:spPr>
           <a:xfrm>
-            <a:off x="7315200" y="4645152"/>
-            <a:ext cx="1371600" cy="320040"/>
-          </a:xfrm>
-          <a:prstGeom prst="rect">
-            <a:avLst/>
-          </a:prstGeom>
-          <a:noFill/>
-        </p:spPr>
-        <p:txBody>
-          <a:bodyPr wrap="square">
-            <a:spAutoFit/>
-          </a:bodyPr>
-          <a:lstStyle/>
-          <a:p>
-            <a:pPr algn="r">
+            <a:off x="3657600" y="4645152"/>
+            <a:ext cx="1828800" cy="320040"/>
+          </a:xfrm>
+          <a:prstGeom prst="rect">
+            <a:avLst/>
+          </a:prstGeom>
+          <a:noFill/>
+        </p:spPr>
+        <p:txBody>
+          <a:bodyPr wrap="square">
+            <a:spAutoFit/>
+          </a:bodyPr>
+          <a:lstStyle/>
+          <a:p>
+            <a:pPr algn="ctr">
               <a:defRPr sz="900" b="0">
                 <a:solidFill>
                   <a:srgbClr val="94A3B8"/>
@@ -4384,7 +4384,7 @@
           </a:bodyPr>
           <a:lstStyle/>
           <a:p>
-            <a:pPr algn="l">
+            <a:pPr algn="r">
               <a:defRPr sz="900" b="1">
                 <a:solidFill>
                   <a:srgbClr val="94A3B8"/>
@@ -4484,7 +4484,7 @@
           <a:noFill/>
         </p:spPr>
         <p:txBody>
-          <a:bodyPr wrap="square">
+          <a:bodyPr wrap="square" anchor="ctr">
             <a:spAutoFit/>
           </a:bodyPr>
           <a:lstStyle/>
@@ -5241,7 +5241,7 @@
           <a:noFill/>
         </p:spPr>
         <p:txBody>
-          <a:bodyPr wrap="square">
+          <a:bodyPr wrap="square" anchor="ctr">
             <a:spAutoFit/>
           </a:bodyPr>
           <a:lstStyle/>
@@ -6149,7 +6149,7 @@
           <a:noFill/>
         </p:spPr>
         <p:txBody>
-          <a:bodyPr wrap="square">
+          <a:bodyPr wrap="square" anchor="ctr">
             <a:spAutoFit/>
           </a:bodyPr>
           <a:lstStyle/>
@@ -7131,7 +7131,7 @@
           <a:noFill/>
         </p:spPr>
         <p:txBody>
-          <a:bodyPr wrap="square">
+          <a:bodyPr wrap="square" anchor="ctr">
             <a:spAutoFit/>
           </a:bodyPr>
           <a:lstStyle/>
@@ -7941,7 +7941,7 @@
           <a:noFill/>
         </p:spPr>
         <p:txBody>
-          <a:bodyPr wrap="square">
+          <a:bodyPr wrap="square" anchor="ctr">
             <a:spAutoFit/>
           </a:bodyPr>
           <a:lstStyle/>
@@ -9139,7 +9139,7 @@
           <a:noFill/>
         </p:spPr>
         <p:txBody>
-          <a:bodyPr wrap="square">
+          <a:bodyPr wrap="square" anchor="ctr">
             <a:spAutoFit/>
           </a:bodyPr>
           <a:lstStyle/>
@@ -10056,7 +10056,7 @@
           <a:noFill/>
         </p:spPr>
         <p:txBody>
-          <a:bodyPr wrap="square">
+          <a:bodyPr wrap="square" anchor="ctr">
             <a:spAutoFit/>
           </a:bodyPr>
           <a:lstStyle/>
@@ -10794,7 +10794,7 @@
           <a:noFill/>
         </p:spPr>
         <p:txBody>
-          <a:bodyPr wrap="square">
+          <a:bodyPr wrap="square" anchor="ctr">
             <a:spAutoFit/>
           </a:bodyPr>
           <a:lstStyle/>

</xml_diff>